<commit_message>
Made a seperate DI for network module and there were error fetching countries api so made some changes adding OkHttpClient
</commit_message>
<xml_diff>
--- a/docs/5_presentation/InterviewMarkerPresentation.pptx
+++ b/docs/5_presentation/InterviewMarkerPresentation.pptx
@@ -11609,20 +11609,6 @@
           <a:p>
             <a:r>
               <a:rPr lang="en-US" dirty="0"/>
-              <a:t>Cover topics from </a:t>
-            </a:r>
-            <a:r>
-              <a:rPr lang="en-IN" b="1" dirty="0"/>
-              <a:t>CO3002/7002</a:t>
-            </a:r>
-            <a:r>
-              <a:rPr lang="en-IN" dirty="0"/>
-              <a:t>.</a:t>
-            </a:r>
-          </a:p>
-          <a:p>
-            <a:r>
-              <a:rPr lang="en-US" dirty="0"/>
               <a:t>Cover essential financial management concepts like budgeting, expense categorization, and multi-currency support.</a:t>
             </a:r>
           </a:p>

</xml_diff>